<commit_message>
Updating slides for part 2
</commit_message>
<xml_diff>
--- a/unit_01/slides/Unit01-PartI.pptx
+++ b/unit_01/slides/Unit01-PartI.pptx
@@ -226,7 +226,7 @@
           <a:p>
             <a:fld id="{DEF45A3F-F083-4E1A-8339-FCD652B27D36}" type="datetimeFigureOut">
               <a:rPr lang="en-US" smtClean="0"/>
-              <a:t>9/2/2020</a:t>
+              <a:t>9/3/2020</a:t>
             </a:fld>
             <a:endParaRPr lang="en-US" dirty="0"/>
           </a:p>
@@ -1046,7 +1046,7 @@
           <a:p>
             <a:fld id="{EB2553B6-A683-4C13-ADF3-6E78B5B860F6}" type="datetime1">
               <a:rPr lang="en-US" smtClean="0"/>
-              <a:t>9/2/2020</a:t>
+              <a:t>9/3/2020</a:t>
             </a:fld>
             <a:endParaRPr lang="en-US" dirty="0"/>
           </a:p>
@@ -1248,7 +1248,7 @@
           <a:p>
             <a:fld id="{6DA00B11-1D47-4652-AEE5-4C2B1235CB66}" type="datetime1">
               <a:rPr lang="en-US" smtClean="0"/>
-              <a:t>9/2/2020</a:t>
+              <a:t>9/3/2020</a:t>
             </a:fld>
             <a:endParaRPr lang="en-US" dirty="0"/>
           </a:p>
@@ -1847,7 +1847,7 @@
           <a:p>
             <a:fld id="{90AC2323-8C5A-462B-92B9-62EA14FA9E94}" type="datetime1">
               <a:rPr lang="en-US" smtClean="0"/>
-              <a:t>9/2/2020</a:t>
+              <a:t>9/3/2020</a:t>
             </a:fld>
             <a:endParaRPr lang="en-US" dirty="0"/>
           </a:p>
@@ -2167,7 +2167,7 @@
           <a:p>
             <a:fld id="{10DC40C2-59E9-46C8-B03E-7C20E5F4F12D}" type="datetime1">
               <a:rPr lang="en-US" smtClean="0"/>
-              <a:t>9/2/2020</a:t>
+              <a:t>9/3/2020</a:t>
             </a:fld>
             <a:endParaRPr lang="en-US" dirty="0"/>
           </a:p>
@@ -2604,7 +2604,7 @@
           <a:p>
             <a:fld id="{7FBC8CB6-941B-4270-8276-FD8E92A373DA}" type="datetime1">
               <a:rPr lang="en-US" smtClean="0"/>
-              <a:t>9/2/2020</a:t>
+              <a:t>9/3/2020</a:t>
             </a:fld>
             <a:endParaRPr lang="en-US" dirty="0"/>
           </a:p>
@@ -2722,7 +2722,7 @@
           <a:p>
             <a:fld id="{15E57E43-E251-46CB-9ADD-5572689A0D73}" type="datetime1">
               <a:rPr lang="en-US" smtClean="0"/>
-              <a:t>9/2/2020</a:t>
+              <a:t>9/3/2020</a:t>
             </a:fld>
             <a:endParaRPr lang="en-US" dirty="0"/>
           </a:p>
@@ -2817,7 +2817,7 @@
           <a:p>
             <a:fld id="{9582FC12-F480-42AE-9F3F-3DA69EB64A0D}" type="datetime1">
               <a:rPr lang="en-US" smtClean="0"/>
-              <a:t>9/2/2020</a:t>
+              <a:t>9/3/2020</a:t>
             </a:fld>
             <a:endParaRPr lang="en-US" dirty="0"/>
           </a:p>
@@ -3234,7 +3234,7 @@
           <a:p>
             <a:fld id="{545CEF3F-6F6A-4297-B757-FFB5D4A3AD64}" type="datetime1">
               <a:rPr lang="en-US" smtClean="0"/>
-              <a:t>9/2/2020</a:t>
+              <a:t>9/3/2020</a:t>
             </a:fld>
             <a:endParaRPr lang="en-US" dirty="0"/>
           </a:p>
@@ -3494,7 +3494,7 @@
           <a:p>
             <a:fld id="{EE2F6E23-5248-4ECD-8C29-1FB95B395C86}" type="datetime1">
               <a:rPr lang="en-US" smtClean="0"/>
-              <a:t>9/2/2020</a:t>
+              <a:t>9/3/2020</a:t>
             </a:fld>
             <a:endParaRPr lang="en-US" dirty="0"/>
           </a:p>
@@ -4010,7 +4010,7 @@
           <a:p>
             <a:fld id="{5DE9F2A3-885D-46CC-9642-01CAAE4EB600}" type="datetime1">
               <a:rPr lang="en-US" smtClean="0"/>
-              <a:t>9/2/2020</a:t>
+              <a:t>9/3/2020</a:t>
             </a:fld>
             <a:endParaRPr lang="en-US" dirty="0"/>
           </a:p>
@@ -6992,53 +6992,6 @@
               <a:t>20</a:t>
             </a:fld>
             <a:endParaRPr lang="en-US" dirty="0"/>
-          </a:p>
-        </p:txBody>
-      </p:sp>
-      <p:sp>
-        <p:nvSpPr>
-          <p:cNvPr id="6" name="Rectangle 5">
-            <a:extLst>
-              <a:ext uri="{FF2B5EF4-FFF2-40B4-BE49-F238E27FC236}">
-                <a16:creationId xmlns:a16="http://schemas.microsoft.com/office/drawing/2014/main" id="{0C71533A-4A29-47E2-A4D4-85E44356516A}"/>
-              </a:ext>
-            </a:extLst>
-          </p:cNvPr>
-          <p:cNvSpPr/>
-          <p:nvPr/>
-        </p:nvSpPr>
-        <p:spPr>
-          <a:xfrm>
-            <a:off x="1066800" y="5818971"/>
-            <a:ext cx="10058400" cy="584775"/>
-          </a:xfrm>
-          <a:prstGeom prst="rect">
-            <a:avLst/>
-          </a:prstGeom>
-        </p:spPr>
-        <p:txBody>
-          <a:bodyPr wrap="square">
-            <a:spAutoFit/>
-          </a:bodyPr>
-          <a:lstStyle/>
-          <a:p>
-            <a:r>
-              <a:rPr lang="en-US" sz="1600" b="1" dirty="0"/>
-              <a:t>Source</a:t>
-            </a:r>
-          </a:p>
-          <a:p>
-            <a:r>
-              <a:rPr lang="en-US" sz="1600" dirty="0">
-                <a:hlinkClick r:id="rId2"/>
-              </a:rPr>
-              <a:t>https://developer.mozilla.org/en-US/docs/Learn/JavaScript/Asynchronous/Concepts</a:t>
-            </a:r>
-            <a:endParaRPr lang="en-US" sz="1600" dirty="0">
-              <a:solidFill>
-                <a:srgbClr val="00B0F0"/>
-              </a:solidFill>
-            </a:endParaRPr>
           </a:p>
         </p:txBody>
       </p:sp>
@@ -11584,6 +11537,15 @@
 </file>
 
 <file path=customXml/item1.xml><?xml version="1.0" encoding="utf-8"?>
+<p:properties xmlns:p="http://schemas.microsoft.com/office/2006/metadata/properties" xmlns:xsi="http://www.w3.org/2001/XMLSchema-instance" xmlns:pc="http://schemas.microsoft.com/office/infopath/2007/PartnerControls">
+  <documentManagement>
+    <Status xmlns="71af3243-3dd4-4a8d-8c0d-dd76da1f02a5">Not started</Status>
+    <MediaServiceKeyPoints xmlns="71af3243-3dd4-4a8d-8c0d-dd76da1f02a5" xsi:nil="true"/>
+  </documentManagement>
+</p:properties>
+</file>
+
+<file path=customXml/item2.xml><?xml version="1.0" encoding="utf-8"?>
 <ct:contentTypeSchema xmlns:ct="http://schemas.microsoft.com/office/2006/metadata/contentType" xmlns:ma="http://schemas.microsoft.com/office/2006/metadata/properties/metaAttributes" ct:_="" ma:_="" ma:contentTypeName="Document" ma:contentTypeID="0x01010079F111ED35F8CC479449609E8A0923A6" ma:contentTypeVersion="12" ma:contentTypeDescription="Create a new document." ma:contentTypeScope="" ma:versionID="a410dd7f93c95333ffa1b60ed6adedd1">
   <xsd:schema xmlns:xsd="http://www.w3.org/2001/XMLSchema" xmlns:xs="http://www.w3.org/2001/XMLSchema" xmlns:p="http://schemas.microsoft.com/office/2006/metadata/properties" xmlns:ns2="71af3243-3dd4-4a8d-8c0d-dd76da1f02a5" xmlns:ns3="16c05727-aa75-4e4a-9b5f-8a80a1165891" targetNamespace="http://schemas.microsoft.com/office/2006/metadata/properties" ma:root="true" ma:fieldsID="a936d9baba76aa3866493feff160faab" ns2:_="" ns3:_="">
     <xsd:import namespace="71af3243-3dd4-4a8d-8c0d-dd76da1f02a5"/>
@@ -11804,15 +11766,6 @@
 </ct:contentTypeSchema>
 </file>
 
-<file path=customXml/item2.xml><?xml version="1.0" encoding="utf-8"?>
-<p:properties xmlns:p="http://schemas.microsoft.com/office/2006/metadata/properties" xmlns:xsi="http://www.w3.org/2001/XMLSchema-instance" xmlns:pc="http://schemas.microsoft.com/office/infopath/2007/PartnerControls">
-  <documentManagement>
-    <Status xmlns="71af3243-3dd4-4a8d-8c0d-dd76da1f02a5">Not started</Status>
-    <MediaServiceKeyPoints xmlns="71af3243-3dd4-4a8d-8c0d-dd76da1f02a5" xsi:nil="true"/>
-  </documentManagement>
-</p:properties>
-</file>
-
 <file path=customXml/item3.xml><?xml version="1.0" encoding="utf-8"?>
 <?mso-contentType ?>
 <FormTemplates xmlns="http://schemas.microsoft.com/sharepoint/v3/contenttype/forms">
@@ -11823,6 +11776,23 @@
 </file>
 
 <file path=customXml/itemProps1.xml><?xml version="1.0" encoding="utf-8"?>
+<ds:datastoreItem xmlns:ds="http://schemas.openxmlformats.org/officeDocument/2006/customXml" ds:itemID="{137651BA-F45C-4845-9AB3-E0A65B39F5E1}">
+  <ds:schemaRefs>
+    <ds:schemaRef ds:uri="http://purl.org/dc/terms/"/>
+    <ds:schemaRef ds:uri="http://schemas.openxmlformats.org/package/2006/metadata/core-properties"/>
+    <ds:schemaRef ds:uri="16c05727-aa75-4e4a-9b5f-8a80a1165891"/>
+    <ds:schemaRef ds:uri="http://schemas.microsoft.com/office/2006/documentManagement/types"/>
+    <ds:schemaRef ds:uri="http://schemas.microsoft.com/office/infopath/2007/PartnerControls"/>
+    <ds:schemaRef ds:uri="http://purl.org/dc/elements/1.1/"/>
+    <ds:schemaRef ds:uri="http://schemas.microsoft.com/office/2006/metadata/properties"/>
+    <ds:schemaRef ds:uri="71af3243-3dd4-4a8d-8c0d-dd76da1f02a5"/>
+    <ds:schemaRef ds:uri="http://www.w3.org/XML/1998/namespace"/>
+    <ds:schemaRef ds:uri="http://purl.org/dc/dcmitype/"/>
+  </ds:schemaRefs>
+</ds:datastoreItem>
+</file>
+
+<file path=customXml/itemProps2.xml><?xml version="1.0" encoding="utf-8"?>
 <ds:datastoreItem xmlns:ds="http://schemas.openxmlformats.org/officeDocument/2006/customXml" ds:itemID="{2D276E62-80A3-44DD-9BCC-97ED2B99B57F}">
   <ds:schemaRefs>
     <ds:schemaRef ds:uri="http://schemas.microsoft.com/office/2006/metadata/contentType"/>
@@ -11841,23 +11811,6 @@
 </ds:datastoreItem>
 </file>
 
-<file path=customXml/itemProps2.xml><?xml version="1.0" encoding="utf-8"?>
-<ds:datastoreItem xmlns:ds="http://schemas.openxmlformats.org/officeDocument/2006/customXml" ds:itemID="{137651BA-F45C-4845-9AB3-E0A65B39F5E1}">
-  <ds:schemaRefs>
-    <ds:schemaRef ds:uri="http://purl.org/dc/terms/"/>
-    <ds:schemaRef ds:uri="http://schemas.openxmlformats.org/package/2006/metadata/core-properties"/>
-    <ds:schemaRef ds:uri="16c05727-aa75-4e4a-9b5f-8a80a1165891"/>
-    <ds:schemaRef ds:uri="http://schemas.microsoft.com/office/2006/documentManagement/types"/>
-    <ds:schemaRef ds:uri="http://schemas.microsoft.com/office/infopath/2007/PartnerControls"/>
-    <ds:schemaRef ds:uri="http://purl.org/dc/elements/1.1/"/>
-    <ds:schemaRef ds:uri="http://schemas.microsoft.com/office/2006/metadata/properties"/>
-    <ds:schemaRef ds:uri="71af3243-3dd4-4a8d-8c0d-dd76da1f02a5"/>
-    <ds:schemaRef ds:uri="http://www.w3.org/XML/1998/namespace"/>
-    <ds:schemaRef ds:uri="http://purl.org/dc/dcmitype/"/>
-  </ds:schemaRefs>
-</ds:datastoreItem>
-</file>
-
 <file path=customXml/itemProps3.xml><?xml version="1.0" encoding="utf-8"?>
 <ds:datastoreItem xmlns:ds="http://schemas.openxmlformats.org/officeDocument/2006/customXml" ds:itemID="{CDB58277-F8DF-46FF-84EC-EF41B835E69F}">
   <ds:schemaRefs>

</xml_diff>

<commit_message>
Fixing mistakes on async examples
</commit_message>
<xml_diff>
--- a/unit_01/slides/Unit01-PartI.pptx
+++ b/unit_01/slides/Unit01-PartI.pptx
@@ -226,7 +226,7 @@
           <a:p>
             <a:fld id="{DEF45A3F-F083-4E1A-8339-FCD652B27D36}" type="datetimeFigureOut">
               <a:rPr lang="en-US" smtClean="0"/>
-              <a:t>9/3/2020</a:t>
+              <a:t>9/8/2020</a:t>
             </a:fld>
             <a:endParaRPr lang="en-US" dirty="0"/>
           </a:p>
@@ -1046,7 +1046,7 @@
           <a:p>
             <a:fld id="{EB2553B6-A683-4C13-ADF3-6E78B5B860F6}" type="datetime1">
               <a:rPr lang="en-US" smtClean="0"/>
-              <a:t>9/3/2020</a:t>
+              <a:t>9/8/2020</a:t>
             </a:fld>
             <a:endParaRPr lang="en-US" dirty="0"/>
           </a:p>
@@ -1248,7 +1248,7 @@
           <a:p>
             <a:fld id="{6DA00B11-1D47-4652-AEE5-4C2B1235CB66}" type="datetime1">
               <a:rPr lang="en-US" smtClean="0"/>
-              <a:t>9/3/2020</a:t>
+              <a:t>9/8/2020</a:t>
             </a:fld>
             <a:endParaRPr lang="en-US" dirty="0"/>
           </a:p>
@@ -1847,7 +1847,7 @@
           <a:p>
             <a:fld id="{90AC2323-8C5A-462B-92B9-62EA14FA9E94}" type="datetime1">
               <a:rPr lang="en-US" smtClean="0"/>
-              <a:t>9/3/2020</a:t>
+              <a:t>9/8/2020</a:t>
             </a:fld>
             <a:endParaRPr lang="en-US" dirty="0"/>
           </a:p>
@@ -2167,7 +2167,7 @@
           <a:p>
             <a:fld id="{10DC40C2-59E9-46C8-B03E-7C20E5F4F12D}" type="datetime1">
               <a:rPr lang="en-US" smtClean="0"/>
-              <a:t>9/3/2020</a:t>
+              <a:t>9/8/2020</a:t>
             </a:fld>
             <a:endParaRPr lang="en-US" dirty="0"/>
           </a:p>
@@ -2604,7 +2604,7 @@
           <a:p>
             <a:fld id="{7FBC8CB6-941B-4270-8276-FD8E92A373DA}" type="datetime1">
               <a:rPr lang="en-US" smtClean="0"/>
-              <a:t>9/3/2020</a:t>
+              <a:t>9/8/2020</a:t>
             </a:fld>
             <a:endParaRPr lang="en-US" dirty="0"/>
           </a:p>
@@ -2722,7 +2722,7 @@
           <a:p>
             <a:fld id="{15E57E43-E251-46CB-9ADD-5572689A0D73}" type="datetime1">
               <a:rPr lang="en-US" smtClean="0"/>
-              <a:t>9/3/2020</a:t>
+              <a:t>9/8/2020</a:t>
             </a:fld>
             <a:endParaRPr lang="en-US" dirty="0"/>
           </a:p>
@@ -2817,7 +2817,7 @@
           <a:p>
             <a:fld id="{9582FC12-F480-42AE-9F3F-3DA69EB64A0D}" type="datetime1">
               <a:rPr lang="en-US" smtClean="0"/>
-              <a:t>9/3/2020</a:t>
+              <a:t>9/8/2020</a:t>
             </a:fld>
             <a:endParaRPr lang="en-US" dirty="0"/>
           </a:p>
@@ -3234,7 +3234,7 @@
           <a:p>
             <a:fld id="{545CEF3F-6F6A-4297-B757-FFB5D4A3AD64}" type="datetime1">
               <a:rPr lang="en-US" smtClean="0"/>
-              <a:t>9/3/2020</a:t>
+              <a:t>9/8/2020</a:t>
             </a:fld>
             <a:endParaRPr lang="en-US" dirty="0"/>
           </a:p>
@@ -3494,7 +3494,7 @@
           <a:p>
             <a:fld id="{EE2F6E23-5248-4ECD-8C29-1FB95B395C86}" type="datetime1">
               <a:rPr lang="en-US" smtClean="0"/>
-              <a:t>9/3/2020</a:t>
+              <a:t>9/8/2020</a:t>
             </a:fld>
             <a:endParaRPr lang="en-US" dirty="0"/>
           </a:p>
@@ -4010,7 +4010,7 @@
           <a:p>
             <a:fld id="{5DE9F2A3-885D-46CC-9642-01CAAE4EB600}" type="datetime1">
               <a:rPr lang="en-US" smtClean="0"/>
-              <a:t>9/3/2020</a:t>
+              <a:t>9/8/2020</a:t>
             </a:fld>
             <a:endParaRPr lang="en-US" dirty="0"/>
           </a:p>
@@ -5229,7 +5229,7 @@
               <a:rPr lang="en-US" sz="1800" b="1">
                 <a:latin typeface="Consolas" panose="020B0609020204030204" pitchFamily="49" charset="0"/>
               </a:rPr>
-              <a:t>node program1.js</a:t>
+              <a:t>node program2.js</a:t>
             </a:r>
           </a:p>
           <a:p>
@@ -7492,13 +7492,13 @@
               <a:rPr lang="en-US" sz="1800" dirty="0">
                 <a:latin typeface="Consolas" panose="020B0609020204030204" pitchFamily="49" charset="0"/>
               </a:rPr>
-              <a:t>.log(todo.</a:t>
+              <a:t>.log</a:t>
             </a:r>
             <a:r>
               <a:rPr lang="en-US" sz="1800">
                 <a:latin typeface="Consolas" panose="020B0609020204030204" pitchFamily="49" charset="0"/>
               </a:rPr>
-              <a:t>text));</a:t>
+              <a:t>(todo));</a:t>
             </a:r>
             <a:endParaRPr lang="en-US" sz="1800" dirty="0">
               <a:latin typeface="Consolas" panose="020B0609020204030204" pitchFamily="49" charset="0"/>
@@ -9224,7 +9224,7 @@
               <a:rPr lang="en-US" sz="1800">
                 <a:latin typeface="Consolas" panose="020B0609020204030204" pitchFamily="49" charset="0"/>
               </a:rPr>
-              <a:t>    console.error(err)</a:t>
+              <a:t>    console.error(err);</a:t>
             </a:r>
           </a:p>
           <a:p>
@@ -11537,15 +11537,6 @@
 </file>
 
 <file path=customXml/item1.xml><?xml version="1.0" encoding="utf-8"?>
-<p:properties xmlns:p="http://schemas.microsoft.com/office/2006/metadata/properties" xmlns:xsi="http://www.w3.org/2001/XMLSchema-instance" xmlns:pc="http://schemas.microsoft.com/office/infopath/2007/PartnerControls">
-  <documentManagement>
-    <Status xmlns="71af3243-3dd4-4a8d-8c0d-dd76da1f02a5">Not started</Status>
-    <MediaServiceKeyPoints xmlns="71af3243-3dd4-4a8d-8c0d-dd76da1f02a5" xsi:nil="true"/>
-  </documentManagement>
-</p:properties>
-</file>
-
-<file path=customXml/item2.xml><?xml version="1.0" encoding="utf-8"?>
 <ct:contentTypeSchema xmlns:ct="http://schemas.microsoft.com/office/2006/metadata/contentType" xmlns:ma="http://schemas.microsoft.com/office/2006/metadata/properties/metaAttributes" ct:_="" ma:_="" ma:contentTypeName="Document" ma:contentTypeID="0x01010079F111ED35F8CC479449609E8A0923A6" ma:contentTypeVersion="12" ma:contentTypeDescription="Create a new document." ma:contentTypeScope="" ma:versionID="a410dd7f93c95333ffa1b60ed6adedd1">
   <xsd:schema xmlns:xsd="http://www.w3.org/2001/XMLSchema" xmlns:xs="http://www.w3.org/2001/XMLSchema" xmlns:p="http://schemas.microsoft.com/office/2006/metadata/properties" xmlns:ns2="71af3243-3dd4-4a8d-8c0d-dd76da1f02a5" xmlns:ns3="16c05727-aa75-4e4a-9b5f-8a80a1165891" targetNamespace="http://schemas.microsoft.com/office/2006/metadata/properties" ma:root="true" ma:fieldsID="a936d9baba76aa3866493feff160faab" ns2:_="" ns3:_="">
     <xsd:import namespace="71af3243-3dd4-4a8d-8c0d-dd76da1f02a5"/>
@@ -11766,6 +11757,15 @@
 </ct:contentTypeSchema>
 </file>
 
+<file path=customXml/item2.xml><?xml version="1.0" encoding="utf-8"?>
+<p:properties xmlns:p="http://schemas.microsoft.com/office/2006/metadata/properties" xmlns:xsi="http://www.w3.org/2001/XMLSchema-instance" xmlns:pc="http://schemas.microsoft.com/office/infopath/2007/PartnerControls">
+  <documentManagement>
+    <Status xmlns="71af3243-3dd4-4a8d-8c0d-dd76da1f02a5">Not started</Status>
+    <MediaServiceKeyPoints xmlns="71af3243-3dd4-4a8d-8c0d-dd76da1f02a5" xsi:nil="true"/>
+  </documentManagement>
+</p:properties>
+</file>
+
 <file path=customXml/item3.xml><?xml version="1.0" encoding="utf-8"?>
 <?mso-contentType ?>
 <FormTemplates xmlns="http://schemas.microsoft.com/sharepoint/v3/contenttype/forms">
@@ -11776,23 +11776,6 @@
 </file>
 
 <file path=customXml/itemProps1.xml><?xml version="1.0" encoding="utf-8"?>
-<ds:datastoreItem xmlns:ds="http://schemas.openxmlformats.org/officeDocument/2006/customXml" ds:itemID="{137651BA-F45C-4845-9AB3-E0A65B39F5E1}">
-  <ds:schemaRefs>
-    <ds:schemaRef ds:uri="http://purl.org/dc/terms/"/>
-    <ds:schemaRef ds:uri="http://schemas.openxmlformats.org/package/2006/metadata/core-properties"/>
-    <ds:schemaRef ds:uri="16c05727-aa75-4e4a-9b5f-8a80a1165891"/>
-    <ds:schemaRef ds:uri="http://schemas.microsoft.com/office/2006/documentManagement/types"/>
-    <ds:schemaRef ds:uri="http://schemas.microsoft.com/office/infopath/2007/PartnerControls"/>
-    <ds:schemaRef ds:uri="http://purl.org/dc/elements/1.1/"/>
-    <ds:schemaRef ds:uri="http://schemas.microsoft.com/office/2006/metadata/properties"/>
-    <ds:schemaRef ds:uri="71af3243-3dd4-4a8d-8c0d-dd76da1f02a5"/>
-    <ds:schemaRef ds:uri="http://www.w3.org/XML/1998/namespace"/>
-    <ds:schemaRef ds:uri="http://purl.org/dc/dcmitype/"/>
-  </ds:schemaRefs>
-</ds:datastoreItem>
-</file>
-
-<file path=customXml/itemProps2.xml><?xml version="1.0" encoding="utf-8"?>
 <ds:datastoreItem xmlns:ds="http://schemas.openxmlformats.org/officeDocument/2006/customXml" ds:itemID="{2D276E62-80A3-44DD-9BCC-97ED2B99B57F}">
   <ds:schemaRefs>
     <ds:schemaRef ds:uri="http://schemas.microsoft.com/office/2006/metadata/contentType"/>
@@ -11811,6 +11794,23 @@
 </ds:datastoreItem>
 </file>
 
+<file path=customXml/itemProps2.xml><?xml version="1.0" encoding="utf-8"?>
+<ds:datastoreItem xmlns:ds="http://schemas.openxmlformats.org/officeDocument/2006/customXml" ds:itemID="{137651BA-F45C-4845-9AB3-E0A65B39F5E1}">
+  <ds:schemaRefs>
+    <ds:schemaRef ds:uri="http://purl.org/dc/terms/"/>
+    <ds:schemaRef ds:uri="http://schemas.openxmlformats.org/package/2006/metadata/core-properties"/>
+    <ds:schemaRef ds:uri="16c05727-aa75-4e4a-9b5f-8a80a1165891"/>
+    <ds:schemaRef ds:uri="http://schemas.microsoft.com/office/2006/documentManagement/types"/>
+    <ds:schemaRef ds:uri="http://schemas.microsoft.com/office/infopath/2007/PartnerControls"/>
+    <ds:schemaRef ds:uri="http://purl.org/dc/elements/1.1/"/>
+    <ds:schemaRef ds:uri="http://schemas.microsoft.com/office/2006/metadata/properties"/>
+    <ds:schemaRef ds:uri="71af3243-3dd4-4a8d-8c0d-dd76da1f02a5"/>
+    <ds:schemaRef ds:uri="http://www.w3.org/XML/1998/namespace"/>
+    <ds:schemaRef ds:uri="http://purl.org/dc/dcmitype/"/>
+  </ds:schemaRefs>
+</ds:datastoreItem>
+</file>
+
 <file path=customXml/itemProps3.xml><?xml version="1.0" encoding="utf-8"?>
 <ds:datastoreItem xmlns:ds="http://schemas.openxmlformats.org/officeDocument/2006/customXml" ds:itemID="{CDB58277-F8DF-46FF-84EC-EF41B835E69F}">
   <ds:schemaRefs>

</xml_diff>